<commit_message>
spelling in slide deck
</commit_message>
<xml_diff>
--- a/Team_3_PPT_deck.pptx
+++ b/Team_3_PPT_deck.pptx
@@ -162,7 +162,7 @@
   <pc:docChgLst>
     <pc:chgData name="Drikus de Wet" userId="89e6c92672e1a68b" providerId="LiveId" clId="{96B9693B-62B9-4B6C-8316-4B6A2BBB040F}"/>
     <pc:docChg chg="modSld">
-      <pc:chgData name="Drikus de Wet" userId="89e6c92672e1a68b" providerId="LiveId" clId="{96B9693B-62B9-4B6C-8316-4B6A2BBB040F}" dt="2021-12-08T07:41:18.772" v="0" actId="478"/>
+      <pc:chgData name="Drikus de Wet" userId="89e6c92672e1a68b" providerId="LiveId" clId="{96B9693B-62B9-4B6C-8316-4B6A2BBB040F}" dt="2021-12-08T07:44:45.576" v="2" actId="20577"/>
       <pc:docMkLst>
         <pc:docMk/>
       </pc:docMkLst>
@@ -180,6 +180,21 @@
             <ac:picMk id="2050" creationId="{C53D5855-FFA2-4CFE-80BE-FB2C8CF45C34}"/>
           </ac:picMkLst>
         </pc:picChg>
+      </pc:sldChg>
+      <pc:sldChg chg="modSp mod">
+        <pc:chgData name="Drikus de Wet" userId="89e6c92672e1a68b" providerId="LiveId" clId="{96B9693B-62B9-4B6C-8316-4B6A2BBB040F}" dt="2021-12-08T07:44:45.576" v="2" actId="20577"/>
+        <pc:sldMkLst>
+          <pc:docMk/>
+          <pc:sldMk cId="2209392453" sldId="330"/>
+        </pc:sldMkLst>
+        <pc:spChg chg="mod">
+          <ac:chgData name="Drikus de Wet" userId="89e6c92672e1a68b" providerId="LiveId" clId="{96B9693B-62B9-4B6C-8316-4B6A2BBB040F}" dt="2021-12-08T07:44:45.576" v="2" actId="20577"/>
+          <ac:spMkLst>
+            <pc:docMk/>
+            <pc:sldMk cId="2209392453" sldId="330"/>
+            <ac:spMk id="2" creationId="{EF84D841-21B0-4CFD-BA9F-6196A945AFFA}"/>
+          </ac:spMkLst>
+        </pc:spChg>
       </pc:sldChg>
     </pc:docChg>
   </pc:docChgLst>
@@ -14288,7 +14303,7 @@
           <a:p>
             <a:pPr defTabSz="457200"/>
             <a:r>
-              <a:rPr lang="en-US" sz="3600" b="0" i="0" kern="1200" dirty="0" err="1">
+              <a:rPr lang="en-US" sz="3600" b="0" i="0" kern="1200">
                 <a:solidFill>
                   <a:srgbClr val="EBEBEB"/>
                 </a:solidFill>
@@ -14296,7 +14311,7 @@
                 <a:ea typeface="+mj-ea"/>
                 <a:cs typeface="+mj-cs"/>
               </a:rPr>
-              <a:t>HANDlING</a:t>
+              <a:t>HANDLING </a:t>
             </a:r>
             <a:r>
               <a:rPr lang="en-US" sz="3600" b="0" i="0" kern="1200" dirty="0">
@@ -14307,7 +14322,7 @@
                 <a:ea typeface="+mj-ea"/>
                 <a:cs typeface="+mj-cs"/>
               </a:rPr>
-              <a:t> Imbalanced data</a:t>
+              <a:t>Imbalanced data</a:t>
             </a:r>
           </a:p>
         </p:txBody>

</xml_diff>